<commit_message>
Add slide about DevOps Remote Conference
Signed-off-by: Nathen Harvey <nharvey@chef.io>
</commit_message>
<xml_diff>
--- a/pdf/DevOpsDC Jan 2017.pptx
+++ b/pdf/DevOpsDC Jan 2017.pptx
@@ -5,7 +5,7 @@
     <p:sldMasterId id="2147483660" r:id="rId1"/>
   </p:sldMasterIdLst>
   <p:notesMasterIdLst>
-    <p:notesMasterId r:id="rId12"/>
+    <p:notesMasterId r:id="rId13"/>
   </p:notesMasterIdLst>
   <p:sldIdLst>
     <p:sldId id="256" r:id="rId2"/>
@@ -14,10 +14,11 @@
     <p:sldId id="259" r:id="rId5"/>
     <p:sldId id="260" r:id="rId6"/>
     <p:sldId id="261" r:id="rId7"/>
-    <p:sldId id="270" r:id="rId8"/>
-    <p:sldId id="266" r:id="rId9"/>
-    <p:sldId id="268" r:id="rId10"/>
-    <p:sldId id="269" r:id="rId11"/>
+    <p:sldId id="271" r:id="rId8"/>
+    <p:sldId id="270" r:id="rId9"/>
+    <p:sldId id="266" r:id="rId10"/>
+    <p:sldId id="268" r:id="rId11"/>
+    <p:sldId id="269" r:id="rId12"/>
   </p:sldIdLst>
   <p:sldSz cx="14630400" cy="8229600"/>
   <p:notesSz cx="6858000" cy="9144000"/>
@@ -669,6 +670,220 @@
   <p:cSld>
     <p:spTree>
       <p:nvGrpSpPr>
+        <p:cNvPr id="1" name="Shape 144"/>
+        <p:cNvGrpSpPr/>
+        <p:nvPr/>
+      </p:nvGrpSpPr>
+      <p:grpSpPr>
+        <a:xfrm>
+          <a:off x="0" y="0"/>
+          <a:ext cx="0" cy="0"/>
+          <a:chOff x="0" y="0"/>
+          <a:chExt cx="0" cy="0"/>
+        </a:xfrm>
+      </p:grpSpPr>
+      <p:sp>
+        <p:nvSpPr>
+          <p:cNvPr id="145" name="Shape 145"/>
+          <p:cNvSpPr>
+            <a:spLocks noGrp="1" noRot="1" noChangeAspect="1"/>
+          </p:cNvSpPr>
+          <p:nvPr>
+            <p:ph type="sldImg" idx="2"/>
+          </p:nvPr>
+        </p:nvSpPr>
+        <p:spPr>
+          <a:xfrm>
+            <a:off x="381000" y="685800"/>
+            <a:ext cx="6096000" cy="3429000"/>
+          </a:xfrm>
+          <a:custGeom>
+            <a:avLst/>
+            <a:gdLst/>
+            <a:ahLst/>
+            <a:cxnLst/>
+            <a:rect l="0" t="0" r="0" b="0"/>
+            <a:pathLst>
+              <a:path w="120000" h="120000" extrusionOk="0">
+                <a:moveTo>
+                  <a:pt x="0" y="0"/>
+                </a:moveTo>
+                <a:lnTo>
+                  <a:pt x="120000" y="0"/>
+                </a:lnTo>
+                <a:lnTo>
+                  <a:pt x="120000" y="120000"/>
+                </a:lnTo>
+                <a:lnTo>
+                  <a:pt x="0" y="120000"/>
+                </a:lnTo>
+                <a:close/>
+              </a:path>
+            </a:pathLst>
+          </a:custGeom>
+          <a:noFill/>
+          <a:ln>
+            <a:noFill/>
+          </a:ln>
+        </p:spPr>
+      </p:sp>
+      <p:sp>
+        <p:nvSpPr>
+          <p:cNvPr id="146" name="Shape 146"/>
+          <p:cNvSpPr txBox="1">
+            <a:spLocks noGrp="1"/>
+          </p:cNvSpPr>
+          <p:nvPr>
+            <p:ph type="body" idx="1"/>
+          </p:nvPr>
+        </p:nvSpPr>
+        <p:spPr>
+          <a:xfrm>
+            <a:off x="914400" y="4343400"/>
+            <a:ext cx="5029199" cy="4114800"/>
+          </a:xfrm>
+          <a:prstGeom prst="rect">
+            <a:avLst/>
+          </a:prstGeom>
+          <a:noFill/>
+          <a:ln>
+            <a:noFill/>
+          </a:ln>
+        </p:spPr>
+        <p:txBody>
+          <a:bodyPr lIns="91425" tIns="45700" rIns="91425" bIns="45700" anchor="t" anchorCtr="0">
+            <a:noAutofit/>
+          </a:bodyPr>
+          <a:lstStyle/>
+          <a:p>
+            <a:pPr marL="0" marR="0" lvl="0" indent="0" algn="l" rtl="0">
+              <a:lnSpc>
+                <a:spcPct val="117999"/>
+              </a:lnSpc>
+              <a:spcBef>
+                <a:spcPts val="0"/>
+              </a:spcBef>
+              <a:buSzPct val="25000"/>
+              <a:buNone/>
+            </a:pPr>
+            <a:r>
+              <a:rPr lang="en-US" dirty="0" smtClean="0"/>
+              <a:t>February is the third Tuesday because of Valentine’s Day.  This is the first meeting of the NOVA </a:t>
+            </a:r>
+            <a:r>
+              <a:rPr lang="en-US" dirty="0" err="1" smtClean="0"/>
+              <a:t>DevOps</a:t>
+            </a:r>
+            <a:r>
+              <a:rPr lang="en-US" dirty="0" smtClean="0"/>
+              <a:t> group so we want to support and help them get started.</a:t>
+            </a:r>
+          </a:p>
+          <a:p>
+            <a:pPr marL="0" marR="0" lvl="0" indent="0" algn="l" rtl="0">
+              <a:lnSpc>
+                <a:spcPct val="117999"/>
+              </a:lnSpc>
+              <a:spcBef>
+                <a:spcPts val="0"/>
+              </a:spcBef>
+              <a:buSzPct val="25000"/>
+              <a:buNone/>
+            </a:pPr>
+            <a:endParaRPr lang="en-US" sz="2200" b="0" i="0" u="none" strike="noStrike" cap="none" dirty="0" smtClean="0">
+              <a:latin typeface="Helvetica Neue"/>
+              <a:ea typeface="Helvetica Neue"/>
+              <a:cs typeface="Helvetica Neue"/>
+              <a:sym typeface="Helvetica Neue"/>
+            </a:endParaRPr>
+          </a:p>
+          <a:p>
+            <a:pPr marL="0" marR="0" lvl="0" indent="0" algn="l" rtl="0">
+              <a:lnSpc>
+                <a:spcPct val="117999"/>
+              </a:lnSpc>
+              <a:spcBef>
+                <a:spcPts val="0"/>
+              </a:spcBef>
+              <a:buSzPct val="25000"/>
+              <a:buNone/>
+            </a:pPr>
+            <a:r>
+              <a:rPr lang="en-US" sz="2200" b="0" i="0" u="none" strike="noStrike" cap="none" dirty="0" smtClean="0">
+                <a:latin typeface="Helvetica Neue"/>
+                <a:ea typeface="Helvetica Neue"/>
+                <a:cs typeface="Helvetica Neue"/>
+                <a:sym typeface="Helvetica Neue"/>
+              </a:rPr>
+              <a:t>We have one speaker, </a:t>
+            </a:r>
+            <a:r>
+              <a:rPr lang="en-US" sz="2200" b="0" i="0" u="none" strike="noStrike" cap="none" dirty="0" err="1" smtClean="0">
+                <a:latin typeface="Helvetica Neue"/>
+                <a:ea typeface="Helvetica Neue"/>
+                <a:cs typeface="Helvetica Neue"/>
+                <a:sym typeface="Helvetica Neue"/>
+              </a:rPr>
+              <a:t>DivvyCloud</a:t>
+            </a:r>
+            <a:r>
+              <a:rPr lang="en-US" sz="2200" b="0" i="0" u="none" strike="noStrike" cap="none" dirty="0" smtClean="0">
+                <a:latin typeface="Helvetica Neue"/>
+                <a:ea typeface="Helvetica Neue"/>
+                <a:cs typeface="Helvetica Neue"/>
+                <a:sym typeface="Helvetica Neue"/>
+              </a:rPr>
+              <a:t>,</a:t>
+            </a:r>
+            <a:r>
+              <a:rPr lang="en-US" sz="2200" b="0" i="0" u="none" strike="noStrike" cap="none" baseline="0" dirty="0" smtClean="0">
+                <a:latin typeface="Helvetica Neue"/>
+                <a:ea typeface="Helvetica Neue"/>
+                <a:cs typeface="Helvetica Neue"/>
+                <a:sym typeface="Helvetica Neue"/>
+              </a:rPr>
+              <a:t> already lined-up for March 14.  There are a couple of other people in the pipeline, too. But if YOU want to present, send a PR to the </a:t>
+            </a:r>
+            <a:r>
+              <a:rPr lang="en-US" sz="2200" b="0" i="0" u="none" strike="noStrike" cap="none" baseline="0" dirty="0" err="1" smtClean="0">
+                <a:latin typeface="Helvetica Neue"/>
+                <a:ea typeface="Helvetica Neue"/>
+                <a:cs typeface="Helvetica Neue"/>
+                <a:sym typeface="Helvetica Neue"/>
+              </a:rPr>
+              <a:t>github</a:t>
+            </a:r>
+            <a:r>
+              <a:rPr lang="en-US" sz="2200" b="0" i="0" u="none" strike="noStrike" cap="none" baseline="0" dirty="0" smtClean="0">
+                <a:latin typeface="Helvetica Neue"/>
+                <a:ea typeface="Helvetica Neue"/>
+                <a:cs typeface="Helvetica Neue"/>
+                <a:sym typeface="Helvetica Neue"/>
+              </a:rPr>
+              <a:t> repo</a:t>
+            </a:r>
+            <a:endParaRPr lang="en-US" sz="2200" b="0" i="0" u="none" strike="noStrike" cap="none" dirty="0">
+              <a:latin typeface="Helvetica Neue"/>
+              <a:ea typeface="Helvetica Neue"/>
+              <a:cs typeface="Helvetica Neue"/>
+              <a:sym typeface="Helvetica Neue"/>
+            </a:endParaRPr>
+          </a:p>
+        </p:txBody>
+      </p:sp>
+    </p:spTree>
+  </p:cSld>
+  <p:clrMapOvr>
+    <a:masterClrMapping/>
+  </p:clrMapOvr>
+</p:notes>
+</file>
+
+<file path=ppt/notesSlides/notesSlide11.xml><?xml version="1.0" encoding="utf-8"?>
+<p:notes xmlns:a="http://schemas.openxmlformats.org/drawingml/2006/main" xmlns:r="http://schemas.openxmlformats.org/officeDocument/2006/relationships" xmlns:p="http://schemas.openxmlformats.org/presentationml/2006/main" showMasterSp="0" showMasterPhAnim="0">
+  <p:cSld>
+    <p:spTree>
+      <p:nvGrpSpPr>
         <p:cNvPr id="1" name="Shape 150"/>
         <p:cNvGrpSpPr/>
         <p:nvPr/>
@@ -1528,6 +1743,71 @@
           <a:p>
             <a:r>
               <a:rPr lang="en-US" dirty="0" smtClean="0"/>
+              <a:t>Nathen is speaking on January 18</a:t>
+            </a:r>
+            <a:endParaRPr lang="en-US" dirty="0"/>
+          </a:p>
+        </p:txBody>
+      </p:sp>
+    </p:spTree>
+    <p:extLst>
+      <p:ext uri="{BB962C8B-B14F-4D97-AF65-F5344CB8AC3E}">
+        <p14:creationId xmlns:p14="http://schemas.microsoft.com/office/powerpoint/2010/main" val="1317264597"/>
+      </p:ext>
+    </p:extLst>
+  </p:cSld>
+  <p:clrMapOvr>
+    <a:masterClrMapping/>
+  </p:clrMapOvr>
+</p:notes>
+</file>
+
+<file path=ppt/notesSlides/notesSlide8.xml><?xml version="1.0" encoding="utf-8"?>
+<p:notes xmlns:a="http://schemas.openxmlformats.org/drawingml/2006/main" xmlns:r="http://schemas.openxmlformats.org/officeDocument/2006/relationships" xmlns:p="http://schemas.openxmlformats.org/presentationml/2006/main">
+  <p:cSld>
+    <p:spTree>
+      <p:nvGrpSpPr>
+        <p:cNvPr id="1" name=""/>
+        <p:cNvGrpSpPr/>
+        <p:nvPr/>
+      </p:nvGrpSpPr>
+      <p:grpSpPr>
+        <a:xfrm>
+          <a:off x="0" y="0"/>
+          <a:ext cx="0" cy="0"/>
+          <a:chOff x="0" y="0"/>
+          <a:chExt cx="0" cy="0"/>
+        </a:xfrm>
+      </p:grpSpPr>
+      <p:sp>
+        <p:nvSpPr>
+          <p:cNvPr id="2" name="Slide Image Placeholder 1"/>
+          <p:cNvSpPr>
+            <a:spLocks noGrp="1" noRot="1" noChangeAspect="1"/>
+          </p:cNvSpPr>
+          <p:nvPr>
+            <p:ph type="sldImg"/>
+          </p:nvPr>
+        </p:nvSpPr>
+        <p:spPr/>
+      </p:sp>
+      <p:sp>
+        <p:nvSpPr>
+          <p:cNvPr id="3" name="Notes Placeholder 2"/>
+          <p:cNvSpPr>
+            <a:spLocks noGrp="1"/>
+          </p:cNvSpPr>
+          <p:nvPr>
+            <p:ph type="body" idx="1"/>
+          </p:nvPr>
+        </p:nvSpPr>
+        <p:spPr/>
+        <p:txBody>
+          <a:bodyPr/>
+          <a:lstStyle/>
+          <a:p>
+            <a:r>
+              <a:rPr lang="en-US" dirty="0" smtClean="0"/>
               <a:t>Get</a:t>
             </a:r>
             <a:r>
@@ -1551,7 +1831,7 @@
 </p:notes>
 </file>
 
-<file path=ppt/notesSlides/notesSlide8.xml><?xml version="1.0" encoding="utf-8"?>
+<file path=ppt/notesSlides/notesSlide9.xml><?xml version="1.0" encoding="utf-8"?>
 <p:notes xmlns:a="http://schemas.openxmlformats.org/drawingml/2006/main" xmlns:r="http://schemas.openxmlformats.org/officeDocument/2006/relationships" xmlns:p="http://schemas.openxmlformats.org/presentationml/2006/main" showMasterSp="0" showMasterPhAnim="0">
   <p:cSld>
     <p:spTree>
@@ -1643,220 +1923,6 @@
             </a:pathLst>
           </a:custGeom>
         </p:spPr>
-      </p:sp>
-    </p:spTree>
-  </p:cSld>
-  <p:clrMapOvr>
-    <a:masterClrMapping/>
-  </p:clrMapOvr>
-</p:notes>
-</file>
-
-<file path=ppt/notesSlides/notesSlide9.xml><?xml version="1.0" encoding="utf-8"?>
-<p:notes xmlns:a="http://schemas.openxmlformats.org/drawingml/2006/main" xmlns:r="http://schemas.openxmlformats.org/officeDocument/2006/relationships" xmlns:p="http://schemas.openxmlformats.org/presentationml/2006/main" showMasterSp="0" showMasterPhAnim="0">
-  <p:cSld>
-    <p:spTree>
-      <p:nvGrpSpPr>
-        <p:cNvPr id="1" name="Shape 144"/>
-        <p:cNvGrpSpPr/>
-        <p:nvPr/>
-      </p:nvGrpSpPr>
-      <p:grpSpPr>
-        <a:xfrm>
-          <a:off x="0" y="0"/>
-          <a:ext cx="0" cy="0"/>
-          <a:chOff x="0" y="0"/>
-          <a:chExt cx="0" cy="0"/>
-        </a:xfrm>
-      </p:grpSpPr>
-      <p:sp>
-        <p:nvSpPr>
-          <p:cNvPr id="145" name="Shape 145"/>
-          <p:cNvSpPr>
-            <a:spLocks noGrp="1" noRot="1" noChangeAspect="1"/>
-          </p:cNvSpPr>
-          <p:nvPr>
-            <p:ph type="sldImg" idx="2"/>
-          </p:nvPr>
-        </p:nvSpPr>
-        <p:spPr>
-          <a:xfrm>
-            <a:off x="381000" y="685800"/>
-            <a:ext cx="6096000" cy="3429000"/>
-          </a:xfrm>
-          <a:custGeom>
-            <a:avLst/>
-            <a:gdLst/>
-            <a:ahLst/>
-            <a:cxnLst/>
-            <a:rect l="0" t="0" r="0" b="0"/>
-            <a:pathLst>
-              <a:path w="120000" h="120000" extrusionOk="0">
-                <a:moveTo>
-                  <a:pt x="0" y="0"/>
-                </a:moveTo>
-                <a:lnTo>
-                  <a:pt x="120000" y="0"/>
-                </a:lnTo>
-                <a:lnTo>
-                  <a:pt x="120000" y="120000"/>
-                </a:lnTo>
-                <a:lnTo>
-                  <a:pt x="0" y="120000"/>
-                </a:lnTo>
-                <a:close/>
-              </a:path>
-            </a:pathLst>
-          </a:custGeom>
-          <a:noFill/>
-          <a:ln>
-            <a:noFill/>
-          </a:ln>
-        </p:spPr>
-      </p:sp>
-      <p:sp>
-        <p:nvSpPr>
-          <p:cNvPr id="146" name="Shape 146"/>
-          <p:cNvSpPr txBox="1">
-            <a:spLocks noGrp="1"/>
-          </p:cNvSpPr>
-          <p:nvPr>
-            <p:ph type="body" idx="1"/>
-          </p:nvPr>
-        </p:nvSpPr>
-        <p:spPr>
-          <a:xfrm>
-            <a:off x="914400" y="4343400"/>
-            <a:ext cx="5029199" cy="4114800"/>
-          </a:xfrm>
-          <a:prstGeom prst="rect">
-            <a:avLst/>
-          </a:prstGeom>
-          <a:noFill/>
-          <a:ln>
-            <a:noFill/>
-          </a:ln>
-        </p:spPr>
-        <p:txBody>
-          <a:bodyPr lIns="91425" tIns="45700" rIns="91425" bIns="45700" anchor="t" anchorCtr="0">
-            <a:noAutofit/>
-          </a:bodyPr>
-          <a:lstStyle/>
-          <a:p>
-            <a:pPr marL="0" marR="0" lvl="0" indent="0" algn="l" rtl="0">
-              <a:lnSpc>
-                <a:spcPct val="117999"/>
-              </a:lnSpc>
-              <a:spcBef>
-                <a:spcPts val="0"/>
-              </a:spcBef>
-              <a:buSzPct val="25000"/>
-              <a:buNone/>
-            </a:pPr>
-            <a:r>
-              <a:rPr lang="en-US" dirty="0" smtClean="0"/>
-              <a:t>February is the third Tuesday because of Valentine’s Day.  This is the first meeting of the NOVA </a:t>
-            </a:r>
-            <a:r>
-              <a:rPr lang="en-US" dirty="0" err="1" smtClean="0"/>
-              <a:t>DevOps</a:t>
-            </a:r>
-            <a:r>
-              <a:rPr lang="en-US" dirty="0" smtClean="0"/>
-              <a:t> group so we want to support and help them get started.</a:t>
-            </a:r>
-          </a:p>
-          <a:p>
-            <a:pPr marL="0" marR="0" lvl="0" indent="0" algn="l" rtl="0">
-              <a:lnSpc>
-                <a:spcPct val="117999"/>
-              </a:lnSpc>
-              <a:spcBef>
-                <a:spcPts val="0"/>
-              </a:spcBef>
-              <a:buSzPct val="25000"/>
-              <a:buNone/>
-            </a:pPr>
-            <a:endParaRPr lang="en-US" sz="2200" b="0" i="0" u="none" strike="noStrike" cap="none" dirty="0" smtClean="0">
-              <a:latin typeface="Helvetica Neue"/>
-              <a:ea typeface="Helvetica Neue"/>
-              <a:cs typeface="Helvetica Neue"/>
-              <a:sym typeface="Helvetica Neue"/>
-            </a:endParaRPr>
-          </a:p>
-          <a:p>
-            <a:pPr marL="0" marR="0" lvl="0" indent="0" algn="l" rtl="0">
-              <a:lnSpc>
-                <a:spcPct val="117999"/>
-              </a:lnSpc>
-              <a:spcBef>
-                <a:spcPts val="0"/>
-              </a:spcBef>
-              <a:buSzPct val="25000"/>
-              <a:buNone/>
-            </a:pPr>
-            <a:r>
-              <a:rPr lang="en-US" sz="2200" b="0" i="0" u="none" strike="noStrike" cap="none" dirty="0" smtClean="0">
-                <a:latin typeface="Helvetica Neue"/>
-                <a:ea typeface="Helvetica Neue"/>
-                <a:cs typeface="Helvetica Neue"/>
-                <a:sym typeface="Helvetica Neue"/>
-              </a:rPr>
-              <a:t>We have one speaker, </a:t>
-            </a:r>
-            <a:r>
-              <a:rPr lang="en-US" sz="2200" b="0" i="0" u="none" strike="noStrike" cap="none" dirty="0" err="1" smtClean="0">
-                <a:latin typeface="Helvetica Neue"/>
-                <a:ea typeface="Helvetica Neue"/>
-                <a:cs typeface="Helvetica Neue"/>
-                <a:sym typeface="Helvetica Neue"/>
-              </a:rPr>
-              <a:t>DivvyCloud</a:t>
-            </a:r>
-            <a:r>
-              <a:rPr lang="en-US" sz="2200" b="0" i="0" u="none" strike="noStrike" cap="none" dirty="0" smtClean="0">
-                <a:latin typeface="Helvetica Neue"/>
-                <a:ea typeface="Helvetica Neue"/>
-                <a:cs typeface="Helvetica Neue"/>
-                <a:sym typeface="Helvetica Neue"/>
-              </a:rPr>
-              <a:t>,</a:t>
-            </a:r>
-            <a:r>
-              <a:rPr lang="en-US" sz="2200" b="0" i="0" u="none" strike="noStrike" cap="none" baseline="0" dirty="0" smtClean="0">
-                <a:latin typeface="Helvetica Neue"/>
-                <a:ea typeface="Helvetica Neue"/>
-                <a:cs typeface="Helvetica Neue"/>
-                <a:sym typeface="Helvetica Neue"/>
-              </a:rPr>
-              <a:t> already lined-up for March 14.  There are a couple of other people in the pipeline, too. But if YOU want to present, send a PR to the </a:t>
-            </a:r>
-            <a:r>
-              <a:rPr lang="en-US" sz="2200" b="0" i="0" u="none" strike="noStrike" cap="none" baseline="0" dirty="0" err="1" smtClean="0">
-                <a:latin typeface="Helvetica Neue"/>
-                <a:ea typeface="Helvetica Neue"/>
-                <a:cs typeface="Helvetica Neue"/>
-                <a:sym typeface="Helvetica Neue"/>
-              </a:rPr>
-              <a:t>github</a:t>
-            </a:r>
-            <a:r>
-              <a:rPr lang="en-US" sz="2200" b="0" i="0" u="none" strike="noStrike" cap="none" baseline="0" dirty="0" smtClean="0">
-                <a:latin typeface="Helvetica Neue"/>
-                <a:ea typeface="Helvetica Neue"/>
-                <a:cs typeface="Helvetica Neue"/>
-                <a:sym typeface="Helvetica Neue"/>
-              </a:rPr>
-              <a:t> repo</a:t>
-            </a:r>
-            <a:endParaRPr lang="en-US" sz="2200" b="0" i="0" u="none" strike="noStrike" cap="none" dirty="0">
-              <a:latin typeface="Helvetica Neue"/>
-              <a:ea typeface="Helvetica Neue"/>
-              <a:cs typeface="Helvetica Neue"/>
-              <a:sym typeface="Helvetica Neue"/>
-            </a:endParaRPr>
-          </a:p>
-        </p:txBody>
       </p:sp>
     </p:spTree>
   </p:cSld>
@@ -9941,6 +10007,228 @@
   <p:cSld>
     <p:spTree>
       <p:nvGrpSpPr>
+        <p:cNvPr id="1" name="Shape 147"/>
+        <p:cNvGrpSpPr/>
+        <p:nvPr/>
+      </p:nvGrpSpPr>
+      <p:grpSpPr>
+        <a:xfrm>
+          <a:off x="0" y="0"/>
+          <a:ext cx="0" cy="0"/>
+          <a:chOff x="0" y="0"/>
+          <a:chExt cx="0" cy="0"/>
+        </a:xfrm>
+      </p:grpSpPr>
+      <p:sp>
+        <p:nvSpPr>
+          <p:cNvPr id="148" name="Shape 148"/>
+          <p:cNvSpPr txBox="1">
+            <a:spLocks noGrp="1"/>
+          </p:cNvSpPr>
+          <p:nvPr>
+            <p:ph type="title"/>
+          </p:nvPr>
+        </p:nvSpPr>
+        <p:spPr>
+          <a:xfrm>
+            <a:off x="17382" y="375046"/>
+            <a:ext cx="14630400" cy="1821656"/>
+          </a:xfrm>
+          <a:prstGeom prst="rect">
+            <a:avLst/>
+          </a:prstGeom>
+          <a:noFill/>
+          <a:ln>
+            <a:noFill/>
+          </a:ln>
+        </p:spPr>
+        <p:txBody>
+          <a:bodyPr lIns="42855" tIns="42855" rIns="42855" bIns="42855" anchor="ctr" anchorCtr="0">
+            <a:noAutofit/>
+          </a:bodyPr>
+          <a:lstStyle/>
+          <a:p>
+            <a:pPr>
+              <a:buSzPct val="25000"/>
+            </a:pPr>
+            <a:r>
+              <a:rPr lang="en-US"/>
+              <a:t>Upcoming Meetups</a:t>
+            </a:r>
+          </a:p>
+        </p:txBody>
+      </p:sp>
+      <p:sp>
+        <p:nvSpPr>
+          <p:cNvPr id="149" name="Shape 149"/>
+          <p:cNvSpPr txBox="1">
+            <a:spLocks noGrp="1"/>
+          </p:cNvSpPr>
+          <p:nvPr>
+            <p:ph type="body" idx="1"/>
+          </p:nvPr>
+        </p:nvSpPr>
+        <p:spPr>
+          <a:xfrm>
+            <a:off x="1204912" y="2196703"/>
+            <a:ext cx="12717899" cy="4330411"/>
+          </a:xfrm>
+          <a:prstGeom prst="rect">
+            <a:avLst/>
+          </a:prstGeom>
+          <a:noFill/>
+          <a:ln>
+            <a:noFill/>
+          </a:ln>
+        </p:spPr>
+        <p:txBody>
+          <a:bodyPr lIns="42855" tIns="42855" rIns="42855" bIns="42855" anchor="t" anchorCtr="0">
+            <a:normAutofit fontScale="77500" lnSpcReduction="20000"/>
+          </a:bodyPr>
+          <a:lstStyle/>
+          <a:p>
+            <a:pPr marL="685800" indent="-685800"/>
+            <a:r>
+              <a:rPr lang="en-US" sz="4800" dirty="0" smtClean="0">
+                <a:latin typeface="Gill Sans"/>
+                <a:cs typeface="Gill Sans"/>
+              </a:rPr>
+              <a:t>February 21</a:t>
+            </a:r>
+            <a:endParaRPr lang="en-US" sz="4800" dirty="0">
+              <a:latin typeface="Gill Sans"/>
+              <a:cs typeface="Gill Sans"/>
+            </a:endParaRPr>
+          </a:p>
+          <a:p>
+            <a:pPr marL="952500" lvl="1" indent="-685800"/>
+            <a:r>
+              <a:rPr lang="en-US" sz="4800" dirty="0" smtClean="0">
+                <a:latin typeface="Gill Sans"/>
+                <a:cs typeface="Gill Sans"/>
+              </a:rPr>
+              <a:t>Joint </a:t>
+            </a:r>
+            <a:r>
+              <a:rPr lang="en-US" sz="4800" dirty="0" err="1" smtClean="0">
+                <a:latin typeface="Gill Sans"/>
+                <a:cs typeface="Gill Sans"/>
+              </a:rPr>
+              <a:t>meetup</a:t>
+            </a:r>
+            <a:r>
+              <a:rPr lang="en-US" sz="4800" dirty="0" smtClean="0">
+                <a:latin typeface="Gill Sans"/>
+                <a:cs typeface="Gill Sans"/>
+              </a:rPr>
+              <a:t> with NOVA </a:t>
+            </a:r>
+            <a:r>
+              <a:rPr lang="en-US" sz="4800" dirty="0" err="1" smtClean="0">
+                <a:latin typeface="Gill Sans"/>
+                <a:cs typeface="Gill Sans"/>
+              </a:rPr>
+              <a:t>DevOps</a:t>
+            </a:r>
+            <a:r>
+              <a:rPr lang="en-US" sz="4800" dirty="0" smtClean="0">
+                <a:latin typeface="Gill Sans"/>
+                <a:cs typeface="Gill Sans"/>
+              </a:rPr>
+              <a:t> in Reston</a:t>
+            </a:r>
+          </a:p>
+          <a:p>
+            <a:pPr marL="685800" indent="-685800"/>
+            <a:r>
+              <a:rPr lang="en-US" sz="4800" dirty="0" smtClean="0">
+                <a:latin typeface="Gill Sans"/>
+                <a:cs typeface="Gill Sans"/>
+              </a:rPr>
+              <a:t>March 14</a:t>
+            </a:r>
+          </a:p>
+          <a:p>
+            <a:pPr marL="1219200" lvl="2" indent="-685800"/>
+            <a:r>
+              <a:rPr lang="en-US" sz="4800" dirty="0" smtClean="0">
+                <a:latin typeface="Gill Sans"/>
+                <a:cs typeface="Gill Sans"/>
+              </a:rPr>
+              <a:t>Here in the ATX</a:t>
+            </a:r>
+          </a:p>
+          <a:p>
+            <a:pPr marL="685800" indent="-685800"/>
+            <a:r>
+              <a:rPr lang="en-US" sz="4800" dirty="0">
+                <a:latin typeface="Gill Sans"/>
+                <a:cs typeface="Gill Sans"/>
+              </a:rPr>
+              <a:t>https://</a:t>
+            </a:r>
+            <a:r>
+              <a:rPr lang="en-US" sz="4800" dirty="0" err="1">
+                <a:latin typeface="Gill Sans"/>
+                <a:cs typeface="Gill Sans"/>
+              </a:rPr>
+              <a:t>github.com</a:t>
+            </a:r>
+            <a:r>
+              <a:rPr lang="en-US" sz="4800" dirty="0">
+                <a:latin typeface="Gill Sans"/>
+                <a:cs typeface="Gill Sans"/>
+              </a:rPr>
+              <a:t>/</a:t>
+            </a:r>
+            <a:r>
+              <a:rPr lang="en-US" sz="4800" dirty="0" err="1">
+                <a:latin typeface="Gill Sans"/>
+                <a:cs typeface="Gill Sans"/>
+              </a:rPr>
+              <a:t>devopsdc</a:t>
+            </a:r>
+            <a:r>
+              <a:rPr lang="en-US" sz="4800" dirty="0">
+                <a:latin typeface="Gill Sans"/>
+                <a:cs typeface="Gill Sans"/>
+              </a:rPr>
+              <a:t>/</a:t>
+            </a:r>
+            <a:r>
+              <a:rPr lang="en-US" sz="4800" dirty="0" err="1">
+                <a:latin typeface="Gill Sans"/>
+                <a:cs typeface="Gill Sans"/>
+              </a:rPr>
+              <a:t>devopsdc</a:t>
+            </a:r>
+            <a:endParaRPr lang="en-US" sz="4800" dirty="0">
+              <a:latin typeface="Gill Sans"/>
+              <a:cs typeface="Gill Sans"/>
+            </a:endParaRPr>
+          </a:p>
+        </p:txBody>
+      </p:sp>
+    </p:spTree>
+  </p:cSld>
+  <p:clrMapOvr>
+    <a:masterClrMapping/>
+  </p:clrMapOvr>
+  <p:timing>
+    <p:tnLst>
+      <p:par>
+        <p:cTn xmlns:p14="http://schemas.microsoft.com/office/powerpoint/2010/main" id="1" dur="indefinite" restart="never" nodeType="tmRoot"/>
+      </p:par>
+    </p:tnLst>
+  </p:timing>
+</p:sld>
+</file>
+
+<file path=ppt/slides/slide11.xml><?xml version="1.0" encoding="utf-8"?>
+<p:sld xmlns:a="http://schemas.openxmlformats.org/drawingml/2006/main" xmlns:r="http://schemas.openxmlformats.org/officeDocument/2006/relationships" xmlns:p="http://schemas.openxmlformats.org/presentationml/2006/main">
+  <p:cSld>
+    <p:spTree>
+      <p:nvGrpSpPr>
         <p:cNvPr id="1" name="Shape 153"/>
         <p:cNvGrpSpPr/>
         <p:nvPr/>
@@ -10981,6 +11269,135 @@
         </p:nvSpPr>
         <p:spPr/>
         <p:txBody>
+          <a:bodyPr>
+            <a:normAutofit/>
+          </a:bodyPr>
+          <a:lstStyle/>
+          <a:p>
+            <a:r>
+              <a:rPr lang="en-US" sz="5000" dirty="0" err="1" smtClean="0"/>
+              <a:t>devchat.tv</a:t>
+            </a:r>
+            <a:r>
+              <a:rPr lang="en-US" sz="5000" dirty="0"/>
+              <a:t>/conferences/devops-remote-conf-2017</a:t>
+            </a:r>
+          </a:p>
+        </p:txBody>
+      </p:sp>
+      <p:pic>
+        <p:nvPicPr>
+          <p:cNvPr id="3" name="Picture 2" descr="Devops_Remote_Conf_2017.png"/>
+          <p:cNvPicPr>
+            <a:picLocks noChangeAspect="1"/>
+          </p:cNvPicPr>
+          <p:nvPr/>
+        </p:nvPicPr>
+        <p:blipFill>
+          <a:blip r:embed="rId3">
+            <a:extLst>
+              <a:ext uri="{28A0092B-C50C-407E-A947-70E740481C1C}">
+                <a14:useLocalDpi xmlns:a14="http://schemas.microsoft.com/office/drawing/2010/main" val="0"/>
+              </a:ext>
+            </a:extLst>
+          </a:blip>
+          <a:stretch>
+            <a:fillRect/>
+          </a:stretch>
+        </p:blipFill>
+        <p:spPr>
+          <a:xfrm>
+            <a:off x="901700" y="2285096"/>
+            <a:ext cx="12827000" cy="5016500"/>
+          </a:xfrm>
+          <a:prstGeom prst="rect">
+            <a:avLst/>
+          </a:prstGeom>
+        </p:spPr>
+      </p:pic>
+      <p:sp>
+        <p:nvSpPr>
+          <p:cNvPr id="4" name="TextBox 3"/>
+          <p:cNvSpPr txBox="1"/>
+          <p:nvPr/>
+        </p:nvSpPr>
+        <p:spPr>
+          <a:xfrm>
+            <a:off x="1313431" y="6002562"/>
+            <a:ext cx="12003539" cy="861774"/>
+          </a:xfrm>
+          <a:prstGeom prst="rect">
+            <a:avLst/>
+          </a:prstGeom>
+          <a:solidFill>
+            <a:schemeClr val="bg1">
+              <a:alpha val="70000"/>
+            </a:schemeClr>
+          </a:solidFill>
+        </p:spPr>
+        <p:txBody>
+          <a:bodyPr wrap="square" rtlCol="0">
+            <a:spAutoFit/>
+          </a:bodyPr>
+          <a:lstStyle/>
+          <a:p>
+            <a:r>
+              <a:rPr lang="en-US" sz="5000" dirty="0" smtClean="0"/>
+              <a:t>Save 20% with discount code:  MEETUP</a:t>
+            </a:r>
+            <a:endParaRPr lang="en-US" sz="5000" dirty="0"/>
+          </a:p>
+        </p:txBody>
+      </p:sp>
+    </p:spTree>
+    <p:extLst>
+      <p:ext uri="{BB962C8B-B14F-4D97-AF65-F5344CB8AC3E}">
+        <p14:creationId xmlns:p14="http://schemas.microsoft.com/office/powerpoint/2010/main" val="648393530"/>
+      </p:ext>
+    </p:extLst>
+  </p:cSld>
+  <p:clrMapOvr>
+    <a:masterClrMapping/>
+  </p:clrMapOvr>
+  <p:timing>
+    <p:tnLst>
+      <p:par>
+        <p:cTn xmlns:p14="http://schemas.microsoft.com/office/powerpoint/2010/main" id="1" dur="indefinite" restart="never" nodeType="tmRoot"/>
+      </p:par>
+    </p:tnLst>
+  </p:timing>
+</p:sld>
+</file>
+
+<file path=ppt/slides/slide8.xml><?xml version="1.0" encoding="utf-8"?>
+<p:sld xmlns:a="http://schemas.openxmlformats.org/drawingml/2006/main" xmlns:r="http://schemas.openxmlformats.org/officeDocument/2006/relationships" xmlns:p="http://schemas.openxmlformats.org/presentationml/2006/main">
+  <p:cSld>
+    <p:spTree>
+      <p:nvGrpSpPr>
+        <p:cNvPr id="1" name=""/>
+        <p:cNvGrpSpPr/>
+        <p:nvPr/>
+      </p:nvGrpSpPr>
+      <p:grpSpPr>
+        <a:xfrm>
+          <a:off x="0" y="0"/>
+          <a:ext cx="0" cy="0"/>
+          <a:chOff x="0" y="0"/>
+          <a:chExt cx="0" cy="0"/>
+        </a:xfrm>
+      </p:grpSpPr>
+      <p:sp>
+        <p:nvSpPr>
+          <p:cNvPr id="2" name="Title 1"/>
+          <p:cNvSpPr>
+            <a:spLocks noGrp="1"/>
+          </p:cNvSpPr>
+          <p:nvPr>
+            <p:ph type="title"/>
+          </p:nvPr>
+        </p:nvSpPr>
+        <p:spPr/>
+        <p:txBody>
           <a:bodyPr/>
           <a:lstStyle/>
           <a:p>
@@ -11320,10 +11737,17 @@
   <p:clrMapOvr>
     <a:masterClrMapping/>
   </p:clrMapOvr>
+  <p:timing>
+    <p:tnLst>
+      <p:par>
+        <p:cTn xmlns:p14="http://schemas.microsoft.com/office/powerpoint/2010/main" id="1" dur="indefinite" restart="never" nodeType="tmRoot"/>
+      </p:par>
+    </p:tnLst>
+  </p:timing>
 </p:sld>
 </file>
 
-<file path=ppt/slides/slide8.xml><?xml version="1.0" encoding="utf-8"?>
+<file path=ppt/slides/slide9.xml><?xml version="1.0" encoding="utf-8"?>
 <p:sld xmlns:a="http://schemas.openxmlformats.org/drawingml/2006/main" xmlns:r="http://schemas.openxmlformats.org/officeDocument/2006/relationships" xmlns:p="http://schemas.openxmlformats.org/presentationml/2006/main">
   <p:cSld>
     <p:spTree>
@@ -11483,228 +11907,6 @@
           </a:prstGeom>
         </p:spPr>
       </p:pic>
-    </p:spTree>
-  </p:cSld>
-  <p:clrMapOvr>
-    <a:masterClrMapping/>
-  </p:clrMapOvr>
-  <p:timing>
-    <p:tnLst>
-      <p:par>
-        <p:cTn xmlns:p14="http://schemas.microsoft.com/office/powerpoint/2010/main" id="1" dur="indefinite" restart="never" nodeType="tmRoot"/>
-      </p:par>
-    </p:tnLst>
-  </p:timing>
-</p:sld>
-</file>
-
-<file path=ppt/slides/slide9.xml><?xml version="1.0" encoding="utf-8"?>
-<p:sld xmlns:a="http://schemas.openxmlformats.org/drawingml/2006/main" xmlns:r="http://schemas.openxmlformats.org/officeDocument/2006/relationships" xmlns:p="http://schemas.openxmlformats.org/presentationml/2006/main">
-  <p:cSld>
-    <p:spTree>
-      <p:nvGrpSpPr>
-        <p:cNvPr id="1" name="Shape 147"/>
-        <p:cNvGrpSpPr/>
-        <p:nvPr/>
-      </p:nvGrpSpPr>
-      <p:grpSpPr>
-        <a:xfrm>
-          <a:off x="0" y="0"/>
-          <a:ext cx="0" cy="0"/>
-          <a:chOff x="0" y="0"/>
-          <a:chExt cx="0" cy="0"/>
-        </a:xfrm>
-      </p:grpSpPr>
-      <p:sp>
-        <p:nvSpPr>
-          <p:cNvPr id="148" name="Shape 148"/>
-          <p:cNvSpPr txBox="1">
-            <a:spLocks noGrp="1"/>
-          </p:cNvSpPr>
-          <p:nvPr>
-            <p:ph type="title"/>
-          </p:nvPr>
-        </p:nvSpPr>
-        <p:spPr>
-          <a:xfrm>
-            <a:off x="17382" y="375046"/>
-            <a:ext cx="14630400" cy="1821656"/>
-          </a:xfrm>
-          <a:prstGeom prst="rect">
-            <a:avLst/>
-          </a:prstGeom>
-          <a:noFill/>
-          <a:ln>
-            <a:noFill/>
-          </a:ln>
-        </p:spPr>
-        <p:txBody>
-          <a:bodyPr lIns="42855" tIns="42855" rIns="42855" bIns="42855" anchor="ctr" anchorCtr="0">
-            <a:noAutofit/>
-          </a:bodyPr>
-          <a:lstStyle/>
-          <a:p>
-            <a:pPr>
-              <a:buSzPct val="25000"/>
-            </a:pPr>
-            <a:r>
-              <a:rPr lang="en-US"/>
-              <a:t>Upcoming Meetups</a:t>
-            </a:r>
-          </a:p>
-        </p:txBody>
-      </p:sp>
-      <p:sp>
-        <p:nvSpPr>
-          <p:cNvPr id="149" name="Shape 149"/>
-          <p:cNvSpPr txBox="1">
-            <a:spLocks noGrp="1"/>
-          </p:cNvSpPr>
-          <p:nvPr>
-            <p:ph type="body" idx="1"/>
-          </p:nvPr>
-        </p:nvSpPr>
-        <p:spPr>
-          <a:xfrm>
-            <a:off x="1204912" y="2196703"/>
-            <a:ext cx="12717899" cy="4330411"/>
-          </a:xfrm>
-          <a:prstGeom prst="rect">
-            <a:avLst/>
-          </a:prstGeom>
-          <a:noFill/>
-          <a:ln>
-            <a:noFill/>
-          </a:ln>
-        </p:spPr>
-        <p:txBody>
-          <a:bodyPr lIns="42855" tIns="42855" rIns="42855" bIns="42855" anchor="t" anchorCtr="0">
-            <a:normAutofit fontScale="77500" lnSpcReduction="20000"/>
-          </a:bodyPr>
-          <a:lstStyle/>
-          <a:p>
-            <a:pPr marL="685800" indent="-685800"/>
-            <a:r>
-              <a:rPr lang="en-US" sz="4800" dirty="0" smtClean="0">
-                <a:latin typeface="Gill Sans"/>
-                <a:cs typeface="Gill Sans"/>
-              </a:rPr>
-              <a:t>February 21</a:t>
-            </a:r>
-            <a:endParaRPr lang="en-US" sz="4800" dirty="0">
-              <a:latin typeface="Gill Sans"/>
-              <a:cs typeface="Gill Sans"/>
-            </a:endParaRPr>
-          </a:p>
-          <a:p>
-            <a:pPr marL="952500" lvl="1" indent="-685800"/>
-            <a:r>
-              <a:rPr lang="en-US" sz="4800" dirty="0" smtClean="0">
-                <a:latin typeface="Gill Sans"/>
-                <a:cs typeface="Gill Sans"/>
-              </a:rPr>
-              <a:t>Joint </a:t>
-            </a:r>
-            <a:r>
-              <a:rPr lang="en-US" sz="4800" dirty="0" err="1" smtClean="0">
-                <a:latin typeface="Gill Sans"/>
-                <a:cs typeface="Gill Sans"/>
-              </a:rPr>
-              <a:t>meetup</a:t>
-            </a:r>
-            <a:r>
-              <a:rPr lang="en-US" sz="4800" dirty="0" smtClean="0">
-                <a:latin typeface="Gill Sans"/>
-                <a:cs typeface="Gill Sans"/>
-              </a:rPr>
-              <a:t> with NOVA </a:t>
-            </a:r>
-            <a:r>
-              <a:rPr lang="en-US" sz="4800" dirty="0" err="1" smtClean="0">
-                <a:latin typeface="Gill Sans"/>
-                <a:cs typeface="Gill Sans"/>
-              </a:rPr>
-              <a:t>DevOps</a:t>
-            </a:r>
-            <a:r>
-              <a:rPr lang="en-US" sz="4800" dirty="0" smtClean="0">
-                <a:latin typeface="Gill Sans"/>
-                <a:cs typeface="Gill Sans"/>
-              </a:rPr>
-              <a:t> in Reston</a:t>
-            </a:r>
-          </a:p>
-          <a:p>
-            <a:pPr marL="685800" indent="-685800"/>
-            <a:r>
-              <a:rPr lang="en-US" sz="4800" dirty="0" smtClean="0">
-                <a:latin typeface="Gill Sans"/>
-                <a:cs typeface="Gill Sans"/>
-              </a:rPr>
-              <a:t>March 14</a:t>
-            </a:r>
-          </a:p>
-          <a:p>
-            <a:pPr marL="1219200" lvl="2" indent="-685800"/>
-            <a:r>
-              <a:rPr lang="en-US" sz="4800" dirty="0" smtClean="0">
-                <a:latin typeface="Gill Sans"/>
-                <a:cs typeface="Gill Sans"/>
-              </a:rPr>
-              <a:t>Here in the ATX</a:t>
-            </a:r>
-          </a:p>
-          <a:p>
-            <a:pPr marL="685800" indent="-685800"/>
-            <a:r>
-              <a:rPr lang="en-US" sz="4800" dirty="0">
-                <a:latin typeface="Gill Sans"/>
-                <a:cs typeface="Gill Sans"/>
-              </a:rPr>
-              <a:t>https://</a:t>
-            </a:r>
-            <a:r>
-              <a:rPr lang="en-US" sz="4800" dirty="0" err="1">
-                <a:latin typeface="Gill Sans"/>
-                <a:cs typeface="Gill Sans"/>
-              </a:rPr>
-              <a:t>github.com</a:t>
-            </a:r>
-            <a:r>
-              <a:rPr lang="en-US" sz="4800" dirty="0">
-                <a:latin typeface="Gill Sans"/>
-                <a:cs typeface="Gill Sans"/>
-              </a:rPr>
-              <a:t>/</a:t>
-            </a:r>
-            <a:r>
-              <a:rPr lang="en-US" sz="4800" dirty="0" err="1">
-                <a:latin typeface="Gill Sans"/>
-                <a:cs typeface="Gill Sans"/>
-              </a:rPr>
-              <a:t>devopsdc</a:t>
-            </a:r>
-            <a:r>
-              <a:rPr lang="en-US" sz="4800" dirty="0">
-                <a:latin typeface="Gill Sans"/>
-                <a:cs typeface="Gill Sans"/>
-              </a:rPr>
-              <a:t>/</a:t>
-            </a:r>
-            <a:r>
-              <a:rPr lang="en-US" sz="4800" dirty="0" err="1">
-                <a:latin typeface="Gill Sans"/>
-                <a:cs typeface="Gill Sans"/>
-              </a:rPr>
-              <a:t>devopsdc</a:t>
-            </a:r>
-            <a:endParaRPr lang="en-US" sz="4800" dirty="0">
-              <a:latin typeface="Gill Sans"/>
-              <a:cs typeface="Gill Sans"/>
-            </a:endParaRPr>
-          </a:p>
-        </p:txBody>
-      </p:sp>
     </p:spTree>
   </p:cSld>
   <p:clrMapOvr>

</xml_diff>